<commit_message>
Update 11 Introduction to Shell Scripting.pptx
</commit_message>
<xml_diff>
--- a/LC UNIX/11 Introduction to Shell Scripting.pptx
+++ b/LC UNIX/11 Introduction to Shell Scripting.pptx
@@ -156,7 +156,7 @@
 <file path=ppt/revisionInfo.xml><?xml version="1.0" encoding="utf-8"?>
 <p1510:revInfo xmlns:a="http://schemas.openxmlformats.org/drawingml/2006/main" xmlns:r="http://schemas.openxmlformats.org/officeDocument/2006/relationships" xmlns:p1510="http://schemas.microsoft.com/office/powerpoint/2015/10/main">
   <p1510:revLst>
-    <p1510:client id="{6211EA97-7412-CC63-1977-41AD100B6E87}" v="37" dt="2025-10-27T07:13:04.758"/>
+    <p1510:client id="{6B3ABACD-2B17-FC42-A9EE-4360F282BF3D}" v="1" dt="2025-10-28T10:46:56.427"/>
   </p1510:revLst>
 </p1510:revInfo>
 </file>
@@ -178,6 +178,30 @@
         </pc:sldMkLst>
         <pc:spChg chg="mod">
           <ac:chgData name="Baráth, Július" userId="S::julius.barath@aos.sk::aebde9b9-dccc-4475-a9ac-c05e78323d7a" providerId="AD" clId="Web-{6211EA97-7412-CC63-1977-41AD100B6E87}" dt="2025-10-27T07:13:04.758" v="36" actId="20577"/>
+          <ac:spMkLst>
+            <pc:docMk/>
+            <pc:sldMk cId="0" sldId="280"/>
+            <ac:spMk id="37" creationId="{00000000-0000-0000-0000-000000000000}"/>
+          </ac:spMkLst>
+        </pc:spChg>
+      </pc:sldChg>
+    </pc:docChg>
+  </pc:docChgLst>
+  <pc:docChgLst>
+    <pc:chgData name="Baráth, Július" userId="aebde9b9-dccc-4475-a9ac-c05e78323d7a" providerId="ADAL" clId="{4A0811C8-ED2F-505E-B787-C8270CED5046}"/>
+    <pc:docChg chg="modSld">
+      <pc:chgData name="Baráth, Július" userId="aebde9b9-dccc-4475-a9ac-c05e78323d7a" providerId="ADAL" clId="{4A0811C8-ED2F-505E-B787-C8270CED5046}" dt="2025-10-28T10:47:04.609" v="1" actId="404"/>
+      <pc:docMkLst>
+        <pc:docMk/>
+      </pc:docMkLst>
+      <pc:sldChg chg="modSp mod">
+        <pc:chgData name="Baráth, Július" userId="aebde9b9-dccc-4475-a9ac-c05e78323d7a" providerId="ADAL" clId="{4A0811C8-ED2F-505E-B787-C8270CED5046}" dt="2025-10-28T10:47:04.609" v="1" actId="404"/>
+        <pc:sldMkLst>
+          <pc:docMk/>
+          <pc:sldMk cId="0" sldId="280"/>
+        </pc:sldMkLst>
+        <pc:spChg chg="mod">
+          <ac:chgData name="Baráth, Július" userId="aebde9b9-dccc-4475-a9ac-c05e78323d7a" providerId="ADAL" clId="{4A0811C8-ED2F-505E-B787-C8270CED5046}" dt="2025-10-28T10:47:04.609" v="1" actId="404"/>
           <ac:spMkLst>
             <pc:docMk/>
             <pc:sldMk cId="0" sldId="280"/>
@@ -423,7 +447,7 @@
                 <a:buNone/>
                 <a:defRPr sz="1400"/>
               </a:pPr>
-              <a:t>27. 10. 2025</a:t>
+              <a:t>28.10.2025</a:t>
             </a:fld>
             <a:endParaRPr lang="sk-SK" sz="1200">
               <a:latin typeface="Liberation Sans" pitchFamily="18"/>
@@ -793,7 +817,7 @@
             <a:fld id="{C7357164-0B51-4B11-8CF0-0ED60DF74312}" type="datetimeFigureOut">
               <a:rPr lang="sk-SK"/>
               <a:pPr lvl="0"/>
-              <a:t>27. 10. 2025</a:t>
+              <a:t>28.10.2025</a:t>
             </a:fld>
             <a:endParaRPr lang="sk-SK"/>
           </a:p>
@@ -5081,66 +5105,22 @@
               <a:buNone/>
             </a:pPr>
             <a:r>
-              <a:rPr lang="sk" sz="4800" err="1">
-                <a:latin typeface="Arial"/>
-                <a:cs typeface="Arial"/>
-                <a:sym typeface="Arial"/>
-              </a:rPr>
-              <a:t>Introduction</a:t>
-            </a:r>
-            <a:r>
               <a:rPr lang="sk" sz="4800" dirty="0">
                 <a:latin typeface="Arial"/>
                 <a:cs typeface="Arial"/>
                 <a:sym typeface="Arial"/>
               </a:rPr>
-              <a:t> to Shell </a:t>
-            </a:r>
-            <a:r>
-              <a:rPr lang="sk" sz="4800" err="1">
-                <a:latin typeface="Arial"/>
-                <a:cs typeface="Arial"/>
-                <a:sym typeface="Arial"/>
-              </a:rPr>
-              <a:t>Scripting</a:t>
+              <a:t>Introduction to Shell Scripting</a:t>
             </a:r>
             <a:br>
               <a:rPr lang="en-US" dirty="0"/>
             </a:br>
             <a:r>
-              <a:rPr lang="sk" sz="2400" err="1">
-                <a:latin typeface="Arial"/>
-                <a:cs typeface="Arial"/>
-              </a:rPr>
-              <a:t>sorce</a:t>
-            </a:r>
-            <a:r>
               <a:rPr lang="sk" sz="2400" dirty="0">
                 <a:latin typeface="Arial"/>
                 <a:cs typeface="Arial"/>
               </a:rPr>
-              <a:t> </a:t>
-            </a:r>
-            <a:r>
-              <a:rPr lang="sk" sz="2400" err="1">
-                <a:latin typeface="Arial"/>
-                <a:cs typeface="Arial"/>
-              </a:rPr>
-              <a:t>code</a:t>
-            </a:r>
-            <a:r>
-              <a:rPr lang="sk" sz="2400" dirty="0">
-                <a:latin typeface="Arial"/>
-                <a:cs typeface="Arial"/>
-              </a:rPr>
-              <a:t> at </a:t>
-            </a:r>
-            <a:r>
-              <a:rPr lang="sk" sz="2400" err="1">
-                <a:latin typeface="Arial"/>
-                <a:cs typeface="Arial"/>
-              </a:rPr>
-              <a:t>github</a:t>
+              <a:t>sorce code at github</a:t>
             </a:r>
             <a:br>
               <a:rPr lang="sk" sz="2400" dirty="0">
@@ -5149,13 +5129,48 @@
               </a:rPr>
             </a:br>
             <a:r>
-              <a:rPr lang="sk" sz="2800" dirty="0">
+              <a:rPr lang="sk" sz="2400" dirty="0">
                 <a:latin typeface="Arial"/>
                 <a:cs typeface="Arial"/>
               </a:rPr>
-              <a:t>git clone https://github.com/jb23lm87/priklady.git</a:t>
-            </a:r>
-            <a:endParaRPr lang="sk" sz="2800"/>
+              <a:t>git clone </a:t>
+            </a:r>
+            <a:r>
+              <a:rPr lang="sk-SK" sz="2400" dirty="0" err="1">
+                <a:latin typeface="Arial"/>
+                <a:cs typeface="Arial"/>
+              </a:rPr>
+              <a:t>https</a:t>
+            </a:r>
+            <a:r>
+              <a:rPr lang="sk-SK" sz="2400" dirty="0">
+                <a:latin typeface="Arial"/>
+                <a:cs typeface="Arial"/>
+              </a:rPr>
+              <a:t>://</a:t>
+            </a:r>
+            <a:r>
+              <a:rPr lang="sk-SK" sz="2400" dirty="0" err="1">
+                <a:latin typeface="Arial"/>
+                <a:cs typeface="Arial"/>
+              </a:rPr>
+              <a:t>github.com</a:t>
+            </a:r>
+            <a:r>
+              <a:rPr lang="sk-SK" sz="2400" dirty="0">
+                <a:latin typeface="Arial"/>
+                <a:cs typeface="Arial"/>
+              </a:rPr>
+              <a:t>/jb23lm87/UNIX-LC-</a:t>
+            </a:r>
+            <a:r>
+              <a:rPr lang="sk-SK" sz="2400" dirty="0" err="1">
+                <a:latin typeface="Arial"/>
+                <a:cs typeface="Arial"/>
+              </a:rPr>
+              <a:t>priklady.git</a:t>
+            </a:r>
+            <a:endParaRPr lang="sk" sz="2800" dirty="0"/>
           </a:p>
         </p:txBody>
       </p:sp>

</xml_diff>